<commit_message>
readme corrected two failure modes added
</commit_message>
<xml_diff>
--- a/COCO2024project_GiacomoMastroddi.pptx
+++ b/COCO2024project_GiacomoMastroddi.pptx
@@ -204,7 +204,7 @@
           <a:p>
             <a:fld id="{B23DDC2E-E20B-4F31-AB9F-3CEBECD89272}" type="datetimeFigureOut">
               <a:rPr lang="it-CH" smtClean="0"/>
-              <a:t>02.06.2024</a:t>
+              <a:t>03.06.2024</a:t>
             </a:fld>
             <a:endParaRPr lang="it-CH"/>
           </a:p>
@@ -789,7 +789,7 @@
           <a:p>
             <a:fld id="{E3F38241-24FC-4C1F-BA1C-98419CB7AEA7}" type="datetimeFigureOut">
               <a:rPr lang="it-CH" smtClean="0"/>
-              <a:t>02.06.2024</a:t>
+              <a:t>03.06.2024</a:t>
             </a:fld>
             <a:endParaRPr lang="it-CH"/>
           </a:p>
@@ -989,7 +989,7 @@
           <a:p>
             <a:fld id="{E3F38241-24FC-4C1F-BA1C-98419CB7AEA7}" type="datetimeFigureOut">
               <a:rPr lang="it-CH" smtClean="0"/>
-              <a:t>02.06.2024</a:t>
+              <a:t>03.06.2024</a:t>
             </a:fld>
             <a:endParaRPr lang="it-CH"/>
           </a:p>
@@ -1199,7 +1199,7 @@
           <a:p>
             <a:fld id="{E3F38241-24FC-4C1F-BA1C-98419CB7AEA7}" type="datetimeFigureOut">
               <a:rPr lang="it-CH" smtClean="0"/>
-              <a:t>02.06.2024</a:t>
+              <a:t>03.06.2024</a:t>
             </a:fld>
             <a:endParaRPr lang="it-CH"/>
           </a:p>
@@ -1399,7 +1399,7 @@
           <a:p>
             <a:fld id="{E3F38241-24FC-4C1F-BA1C-98419CB7AEA7}" type="datetimeFigureOut">
               <a:rPr lang="it-CH" smtClean="0"/>
-              <a:t>02.06.2024</a:t>
+              <a:t>03.06.2024</a:t>
             </a:fld>
             <a:endParaRPr lang="it-CH"/>
           </a:p>
@@ -1675,7 +1675,7 @@
           <a:p>
             <a:fld id="{E3F38241-24FC-4C1F-BA1C-98419CB7AEA7}" type="datetimeFigureOut">
               <a:rPr lang="it-CH" smtClean="0"/>
-              <a:t>02.06.2024</a:t>
+              <a:t>03.06.2024</a:t>
             </a:fld>
             <a:endParaRPr lang="it-CH"/>
           </a:p>
@@ -1943,7 +1943,7 @@
           <a:p>
             <a:fld id="{E3F38241-24FC-4C1F-BA1C-98419CB7AEA7}" type="datetimeFigureOut">
               <a:rPr lang="it-CH" smtClean="0"/>
-              <a:t>02.06.2024</a:t>
+              <a:t>03.06.2024</a:t>
             </a:fld>
             <a:endParaRPr lang="it-CH"/>
           </a:p>
@@ -2358,7 +2358,7 @@
           <a:p>
             <a:fld id="{E3F38241-24FC-4C1F-BA1C-98419CB7AEA7}" type="datetimeFigureOut">
               <a:rPr lang="it-CH" smtClean="0"/>
-              <a:t>02.06.2024</a:t>
+              <a:t>03.06.2024</a:t>
             </a:fld>
             <a:endParaRPr lang="it-CH"/>
           </a:p>
@@ -2500,7 +2500,7 @@
           <a:p>
             <a:fld id="{E3F38241-24FC-4C1F-BA1C-98419CB7AEA7}" type="datetimeFigureOut">
               <a:rPr lang="it-CH" smtClean="0"/>
-              <a:t>02.06.2024</a:t>
+              <a:t>03.06.2024</a:t>
             </a:fld>
             <a:endParaRPr lang="it-CH"/>
           </a:p>
@@ -2613,7 +2613,7 @@
           <a:p>
             <a:fld id="{E3F38241-24FC-4C1F-BA1C-98419CB7AEA7}" type="datetimeFigureOut">
               <a:rPr lang="it-CH" smtClean="0"/>
-              <a:t>02.06.2024</a:t>
+              <a:t>03.06.2024</a:t>
             </a:fld>
             <a:endParaRPr lang="it-CH"/>
           </a:p>
@@ -2926,7 +2926,7 @@
           <a:p>
             <a:fld id="{E3F38241-24FC-4C1F-BA1C-98419CB7AEA7}" type="datetimeFigureOut">
               <a:rPr lang="it-CH" smtClean="0"/>
-              <a:t>02.06.2024</a:t>
+              <a:t>03.06.2024</a:t>
             </a:fld>
             <a:endParaRPr lang="it-CH"/>
           </a:p>
@@ -3215,7 +3215,7 @@
           <a:p>
             <a:fld id="{E3F38241-24FC-4C1F-BA1C-98419CB7AEA7}" type="datetimeFigureOut">
               <a:rPr lang="it-CH" smtClean="0"/>
-              <a:t>02.06.2024</a:t>
+              <a:t>03.06.2024</a:t>
             </a:fld>
             <a:endParaRPr lang="it-CH"/>
           </a:p>
@@ -3458,7 +3458,7 @@
           <a:p>
             <a:fld id="{E3F38241-24FC-4C1F-BA1C-98419CB7AEA7}" type="datetimeFigureOut">
               <a:rPr lang="it-CH" smtClean="0"/>
-              <a:t>02.06.2024</a:t>
+              <a:t>03.06.2024</a:t>
             </a:fld>
             <a:endParaRPr lang="it-CH"/>
           </a:p>
@@ -7829,7 +7829,7 @@
         <p:spPr>
           <a:xfrm>
             <a:off x="5440168" y="2782668"/>
-            <a:ext cx="4236377" cy="646331"/>
+            <a:ext cx="4236377" cy="923330"/>
           </a:xfrm>
           <a:prstGeom prst="rect">
             <a:avLst/>
@@ -7846,6 +7846,15 @@
               <a:rPr lang="it-CH" b="1" dirty="0"/>
               <a:t>Giacomo Mastroddi</a:t>
             </a:r>
+          </a:p>
+          <a:p>
+            <a:r>
+              <a:rPr lang="it-CH" b="1" dirty="0">
+                <a:hlinkClick r:id="rId3"/>
+              </a:rPr>
+              <a:t>giacomma@ethz.ch</a:t>
+            </a:r>
+            <a:endParaRPr lang="it-CH" b="1" dirty="0"/>
           </a:p>
           <a:p>
             <a:r>
@@ -7871,13 +7880,13 @@
           <p:nvPr/>
         </p:nvPicPr>
         <p:blipFill>
-          <a:blip r:embed="rId3">
+          <a:blip r:embed="rId4">
             <a:extLst>
               <a:ext uri="{28A0092B-C50C-407E-A947-70E740481C1C}">
                 <a14:useLocalDpi xmlns:a14="http://schemas.microsoft.com/office/drawing/2010/main" val="0"/>
               </a:ext>
               <a:ext uri="{96DAC541-7B7A-43D3-8B79-37D633B846F1}">
-                <asvg:svgBlip xmlns:asvg="http://schemas.microsoft.com/office/drawing/2016/SVG/main" r:embed="rId4"/>
+                <asvg:svgBlip xmlns:asvg="http://schemas.microsoft.com/office/drawing/2016/SVG/main" r:embed="rId5"/>
               </a:ext>
             </a:extLst>
           </a:blip>

</xml_diff>